<commit_message>
updates to the deck and exploratory.R
</commit_message>
<xml_diff>
--- a/Projects/Form_477_Analysis/Final/Form 477 Analysis.pptx
+++ b/Projects/Form_477_Analysis/Final/Form 477 Analysis.pptx
@@ -6,19 +6,18 @@
     <p:sldMasterId id="2147483680" r:id="rId2"/>
   </p:sldMasterIdLst>
   <p:notesMasterIdLst>
-    <p:notesMasterId r:id="rId13"/>
+    <p:notesMasterId r:id="rId12"/>
   </p:notesMasterIdLst>
   <p:sldIdLst>
     <p:sldId id="332" r:id="rId3"/>
     <p:sldId id="300" r:id="rId4"/>
-    <p:sldId id="333" r:id="rId5"/>
-    <p:sldId id="331" r:id="rId6"/>
-    <p:sldId id="324" r:id="rId7"/>
-    <p:sldId id="335" r:id="rId8"/>
-    <p:sldId id="334" r:id="rId9"/>
-    <p:sldId id="325" r:id="rId10"/>
-    <p:sldId id="336" r:id="rId11"/>
-    <p:sldId id="337" r:id="rId12"/>
+    <p:sldId id="331" r:id="rId5"/>
+    <p:sldId id="335" r:id="rId6"/>
+    <p:sldId id="334" r:id="rId7"/>
+    <p:sldId id="325" r:id="rId8"/>
+    <p:sldId id="333" r:id="rId9"/>
+    <p:sldId id="336" r:id="rId10"/>
+    <p:sldId id="337" r:id="rId11"/>
   </p:sldIdLst>
   <p:sldSz cx="9144000" cy="6858000" type="screen4x3"/>
   <p:notesSz cx="6858000" cy="9144000"/>
@@ -218,7 +217,7 @@
           <a:p>
             <a:fld id="{79F7B8C6-D88D-F248-BDFC-4164242B481C}" type="datetimeFigureOut">
               <a:rPr lang="en-US" smtClean="0"/>
-              <a:t>5/22/17</a:t>
+              <a:t>5/23/17</a:t>
             </a:fld>
             <a:endParaRPr lang="en-US" dirty="0"/>
           </a:p>
@@ -614,90 +613,6 @@
           <a:bodyPr/>
           <a:lstStyle/>
           <a:p>
-            <a:endParaRPr lang="en-US" dirty="0"/>
-          </a:p>
-        </p:txBody>
-      </p:sp>
-      <p:sp>
-        <p:nvSpPr>
-          <p:cNvPr id="4" name="Slide Number Placeholder 3"/>
-          <p:cNvSpPr>
-            <a:spLocks noGrp="1"/>
-          </p:cNvSpPr>
-          <p:nvPr>
-            <p:ph type="sldNum" sz="quarter" idx="10"/>
-          </p:nvPr>
-        </p:nvSpPr>
-        <p:spPr/>
-        <p:txBody>
-          <a:bodyPr/>
-          <a:lstStyle/>
-          <a:p>
-            <a:fld id="{0B28C560-31E0-A742-9C56-8219217DD79F}" type="slidenum">
-              <a:rPr lang="en-US" smtClean="0"/>
-              <a:t>3</a:t>
-            </a:fld>
-            <a:endParaRPr lang="en-US"/>
-          </a:p>
-        </p:txBody>
-      </p:sp>
-    </p:spTree>
-    <p:extLst>
-      <p:ext uri="{BB962C8B-B14F-4D97-AF65-F5344CB8AC3E}">
-        <p14:creationId xmlns:p14="http://schemas.microsoft.com/office/powerpoint/2010/main" val="62322443"/>
-      </p:ext>
-    </p:extLst>
-  </p:cSld>
-  <p:clrMapOvr>
-    <a:masterClrMapping/>
-  </p:clrMapOvr>
-</p:notes>
-</file>
-
-<file path=ppt/notesSlides/notesSlide3.xml><?xml version="1.0" encoding="utf-8"?>
-<p:notes xmlns:a="http://schemas.openxmlformats.org/drawingml/2006/main" xmlns:r="http://schemas.openxmlformats.org/officeDocument/2006/relationships" xmlns:p="http://schemas.openxmlformats.org/presentationml/2006/main">
-  <p:cSld>
-    <p:spTree>
-      <p:nvGrpSpPr>
-        <p:cNvPr id="1" name=""/>
-        <p:cNvGrpSpPr/>
-        <p:nvPr/>
-      </p:nvGrpSpPr>
-      <p:grpSpPr>
-        <a:xfrm>
-          <a:off x="0" y="0"/>
-          <a:ext cx="0" cy="0"/>
-          <a:chOff x="0" y="0"/>
-          <a:chExt cx="0" cy="0"/>
-        </a:xfrm>
-      </p:grpSpPr>
-      <p:sp>
-        <p:nvSpPr>
-          <p:cNvPr id="2" name="Slide Image Placeholder 1"/>
-          <p:cNvSpPr>
-            <a:spLocks noGrp="1" noRot="1" noChangeAspect="1"/>
-          </p:cNvSpPr>
-          <p:nvPr>
-            <p:ph type="sldImg"/>
-          </p:nvPr>
-        </p:nvSpPr>
-        <p:spPr/>
-      </p:sp>
-      <p:sp>
-        <p:nvSpPr>
-          <p:cNvPr id="3" name="Notes Placeholder 2"/>
-          <p:cNvSpPr>
-            <a:spLocks noGrp="1"/>
-          </p:cNvSpPr>
-          <p:nvPr>
-            <p:ph type="body" idx="1"/>
-          </p:nvPr>
-        </p:nvSpPr>
-        <p:spPr/>
-        <p:txBody>
-          <a:bodyPr/>
-          <a:lstStyle/>
-          <a:p>
             <a:pPr marL="0" marR="0" indent="0" algn="l" defTabSz="457200" rtl="0" eaLnBrk="1" fontAlgn="auto" latinLnBrk="0" hangingPunct="1">
               <a:lnSpc>
                 <a:spcPct val="100000"/>
@@ -770,7 +685,7 @@
                 </a:solidFill>
               </a:rPr>
               <a:pPr/>
-              <a:t>4</a:t>
+              <a:t>3</a:t>
             </a:fld>
             <a:endParaRPr lang="en-US">
               <a:solidFill>
@@ -784,6 +699,90 @@
     <p:extLst>
       <p:ext uri="{BB962C8B-B14F-4D97-AF65-F5344CB8AC3E}">
         <p14:creationId xmlns:p14="http://schemas.microsoft.com/office/powerpoint/2010/main" val="1069428837"/>
+      </p:ext>
+    </p:extLst>
+  </p:cSld>
+  <p:clrMapOvr>
+    <a:masterClrMapping/>
+  </p:clrMapOvr>
+</p:notes>
+</file>
+
+<file path=ppt/notesSlides/notesSlide3.xml><?xml version="1.0" encoding="utf-8"?>
+<p:notes xmlns:a="http://schemas.openxmlformats.org/drawingml/2006/main" xmlns:r="http://schemas.openxmlformats.org/officeDocument/2006/relationships" xmlns:p="http://schemas.openxmlformats.org/presentationml/2006/main">
+  <p:cSld>
+    <p:spTree>
+      <p:nvGrpSpPr>
+        <p:cNvPr id="1" name=""/>
+        <p:cNvGrpSpPr/>
+        <p:nvPr/>
+      </p:nvGrpSpPr>
+      <p:grpSpPr>
+        <a:xfrm>
+          <a:off x="0" y="0"/>
+          <a:ext cx="0" cy="0"/>
+          <a:chOff x="0" y="0"/>
+          <a:chExt cx="0" cy="0"/>
+        </a:xfrm>
+      </p:grpSpPr>
+      <p:sp>
+        <p:nvSpPr>
+          <p:cNvPr id="2" name="Slide Image Placeholder 1"/>
+          <p:cNvSpPr>
+            <a:spLocks noGrp="1" noRot="1" noChangeAspect="1"/>
+          </p:cNvSpPr>
+          <p:nvPr>
+            <p:ph type="sldImg"/>
+          </p:nvPr>
+        </p:nvSpPr>
+        <p:spPr/>
+      </p:sp>
+      <p:sp>
+        <p:nvSpPr>
+          <p:cNvPr id="3" name="Notes Placeholder 2"/>
+          <p:cNvSpPr>
+            <a:spLocks noGrp="1"/>
+          </p:cNvSpPr>
+          <p:nvPr>
+            <p:ph type="body" idx="1"/>
+          </p:nvPr>
+        </p:nvSpPr>
+        <p:spPr/>
+        <p:txBody>
+          <a:bodyPr/>
+          <a:lstStyle/>
+          <a:p>
+            <a:endParaRPr lang="en-US" dirty="0"/>
+          </a:p>
+        </p:txBody>
+      </p:sp>
+      <p:sp>
+        <p:nvSpPr>
+          <p:cNvPr id="4" name="Slide Number Placeholder 3"/>
+          <p:cNvSpPr>
+            <a:spLocks noGrp="1"/>
+          </p:cNvSpPr>
+          <p:nvPr>
+            <p:ph type="sldNum" sz="quarter" idx="10"/>
+          </p:nvPr>
+        </p:nvSpPr>
+        <p:spPr/>
+        <p:txBody>
+          <a:bodyPr/>
+          <a:lstStyle/>
+          <a:p>
+            <a:fld id="{0B28C560-31E0-A742-9C56-8219217DD79F}" type="slidenum">
+              <a:rPr lang="en-US" smtClean="0"/>
+              <a:t>5</a:t>
+            </a:fld>
+            <a:endParaRPr lang="en-US"/>
+          </a:p>
+        </p:txBody>
+      </p:sp>
+    </p:spTree>
+    <p:extLst>
+      <p:ext uri="{BB962C8B-B14F-4D97-AF65-F5344CB8AC3E}">
+        <p14:creationId xmlns:p14="http://schemas.microsoft.com/office/powerpoint/2010/main" val="1271678655"/>
       </p:ext>
     </p:extLst>
   </p:cSld>
@@ -867,7 +866,7 @@
     </p:spTree>
     <p:extLst>
       <p:ext uri="{BB962C8B-B14F-4D97-AF65-F5344CB8AC3E}">
-        <p14:creationId xmlns:p14="http://schemas.microsoft.com/office/powerpoint/2010/main" val="1271678655"/>
+        <p14:creationId xmlns:p14="http://schemas.microsoft.com/office/powerpoint/2010/main" val="62322443"/>
       </p:ext>
     </p:extLst>
   </p:cSld>
@@ -942,7 +941,7 @@
           <a:p>
             <a:fld id="{0B28C560-31E0-A742-9C56-8219217DD79F}" type="slidenum">
               <a:rPr lang="en-US" smtClean="0"/>
-              <a:t>9</a:t>
+              <a:t>8</a:t>
             </a:fld>
             <a:endParaRPr lang="en-US"/>
           </a:p>
@@ -1026,7 +1025,7 @@
           <a:p>
             <a:fld id="{0B28C560-31E0-A742-9C56-8219217DD79F}" type="slidenum">
               <a:rPr lang="en-US" smtClean="0"/>
-              <a:t>10</a:t>
+              <a:t>9</a:t>
             </a:fld>
             <a:endParaRPr lang="en-US"/>
           </a:p>
@@ -1551,7 +1550,6 @@
               <a:rPr lang="en-US" dirty="0" smtClean="0"/>
               <a:t>Form 477 Analysis</a:t>
             </a:r>
-            <a:endParaRPr lang="en-US" dirty="0" smtClean="0"/>
           </a:p>
         </p:txBody>
       </p:sp>
@@ -21751,184 +21749,6 @@
 </p:sld>
 </file>
 
-<file path=ppt/slides/slide10.xml><?xml version="1.0" encoding="utf-8"?>
-<p:sld xmlns:a="http://schemas.openxmlformats.org/drawingml/2006/main" xmlns:r="http://schemas.openxmlformats.org/officeDocument/2006/relationships" xmlns:p="http://schemas.openxmlformats.org/presentationml/2006/main">
-  <p:cSld>
-    <p:spTree>
-      <p:nvGrpSpPr>
-        <p:cNvPr id="1" name=""/>
-        <p:cNvGrpSpPr/>
-        <p:nvPr/>
-      </p:nvGrpSpPr>
-      <p:grpSpPr>
-        <a:xfrm>
-          <a:off x="0" y="0"/>
-          <a:ext cx="0" cy="0"/>
-          <a:chOff x="0" y="0"/>
-          <a:chExt cx="0" cy="0"/>
-        </a:xfrm>
-      </p:grpSpPr>
-      <p:pic>
-        <p:nvPicPr>
-          <p:cNvPr id="6" name="Picture 5"/>
-          <p:cNvPicPr>
-            <a:picLocks noChangeAspect="1"/>
-          </p:cNvPicPr>
-          <p:nvPr/>
-        </p:nvPicPr>
-        <p:blipFill>
-          <a:blip r:embed="rId3">
-            <a:extLst>
-              <a:ext uri="{28A0092B-C50C-407E-A947-70E740481C1C}">
-                <a14:useLocalDpi xmlns:a14="http://schemas.microsoft.com/office/drawing/2010/main" val="0"/>
-              </a:ext>
-            </a:extLst>
-          </a:blip>
-          <a:stretch>
-            <a:fillRect/>
-          </a:stretch>
-        </p:blipFill>
-        <p:spPr>
-          <a:xfrm>
-            <a:off x="895350" y="687755"/>
-            <a:ext cx="7061200" cy="5125064"/>
-          </a:xfrm>
-          <a:prstGeom prst="rect">
-            <a:avLst/>
-          </a:prstGeom>
-        </p:spPr>
-      </p:pic>
-      <p:sp>
-        <p:nvSpPr>
-          <p:cNvPr id="2" name="Title 1"/>
-          <p:cNvSpPr>
-            <a:spLocks noGrp="1"/>
-          </p:cNvSpPr>
-          <p:nvPr>
-            <p:ph type="title"/>
-          </p:nvPr>
-        </p:nvSpPr>
-        <p:spPr>
-          <a:xfrm>
-            <a:off x="425003" y="315632"/>
-            <a:ext cx="8464997" cy="410223"/>
-          </a:xfrm>
-        </p:spPr>
-        <p:txBody>
-          <a:bodyPr/>
-          <a:lstStyle/>
-          <a:p>
-            <a:r>
-              <a:rPr lang="en-US" dirty="0"/>
-              <a:t>Distribution of the number of service providers in a district’s census block </a:t>
-            </a:r>
-            <a:r>
-              <a:rPr lang="en-US" dirty="0" smtClean="0"/>
-              <a:t>by Fiber </a:t>
-            </a:r>
-            <a:r>
-              <a:rPr lang="en-US" dirty="0"/>
-              <a:t>Target </a:t>
-            </a:r>
-            <a:r>
-              <a:rPr lang="en-US" dirty="0" smtClean="0"/>
-              <a:t>Status </a:t>
-            </a:r>
-            <a:r>
-              <a:rPr lang="mr-IN" dirty="0" smtClean="0"/>
-              <a:t>–</a:t>
-            </a:r>
-            <a:r>
-              <a:rPr lang="en-US" dirty="0" smtClean="0"/>
-              <a:t> States</a:t>
-            </a:r>
-            <a:r>
-              <a:rPr lang="en-US" sz="1600" dirty="0" smtClean="0"/>
-              <a:t> with the </a:t>
-            </a:r>
-            <a:r>
-              <a:rPr lang="en-US" sz="1600" i="1" dirty="0" smtClean="0"/>
-              <a:t>largest differences, </a:t>
-            </a:r>
-            <a:r>
-              <a:rPr lang="en-US" sz="1600" dirty="0" smtClean="0"/>
-              <a:t>adjusted for % Fiber Target districts</a:t>
-            </a:r>
-            <a:endParaRPr lang="en-US" sz="1600" i="1" dirty="0"/>
-          </a:p>
-        </p:txBody>
-      </p:sp>
-      <p:sp>
-        <p:nvSpPr>
-          <p:cNvPr id="5" name="Rectangle 4"/>
-          <p:cNvSpPr/>
-          <p:nvPr/>
-        </p:nvSpPr>
-        <p:spPr>
-          <a:xfrm>
-            <a:off x="425003" y="5723235"/>
-            <a:ext cx="8363397" cy="738664"/>
-          </a:xfrm>
-          <a:prstGeom prst="rect">
-            <a:avLst/>
-          </a:prstGeom>
-        </p:spPr>
-        <p:txBody>
-          <a:bodyPr wrap="square">
-            <a:spAutoFit/>
-          </a:bodyPr>
-          <a:lstStyle/>
-          <a:p>
-            <a:pPr marL="285750" indent="-285750">
-              <a:buFont typeface="Arial" charset="0"/>
-              <a:buChar char="•"/>
-            </a:pPr>
-            <a:r>
-              <a:rPr lang="en-US" sz="1400" dirty="0" smtClean="0"/>
-              <a:t>Alaska, Oregon, California and Arizona are the states with the largest difference in distributions of # service providers, with Fiber Targets having less service providers per census block</a:t>
-            </a:r>
-          </a:p>
-          <a:p>
-            <a:pPr marL="285750" indent="-285750">
-              <a:buFont typeface="Arial" charset="0"/>
-              <a:buChar char="•"/>
-            </a:pPr>
-            <a:r>
-              <a:rPr lang="en-US" sz="1400" dirty="0" smtClean="0"/>
-              <a:t>In Wyoming, Fiber Targets actually have </a:t>
-            </a:r>
-            <a:r>
-              <a:rPr lang="en-US" sz="1400" i="1" dirty="0" smtClean="0"/>
-              <a:t>more </a:t>
-            </a:r>
-            <a:r>
-              <a:rPr lang="en-US" sz="1400" dirty="0" smtClean="0"/>
-              <a:t>service providers per census block</a:t>
-            </a:r>
-            <a:endParaRPr lang="en-US" sz="1400" dirty="0"/>
-          </a:p>
-        </p:txBody>
-      </p:sp>
-    </p:spTree>
-    <p:extLst>
-      <p:ext uri="{BB962C8B-B14F-4D97-AF65-F5344CB8AC3E}">
-        <p14:creationId xmlns:p14="http://schemas.microsoft.com/office/powerpoint/2010/main" val="43021936"/>
-      </p:ext>
-    </p:extLst>
-  </p:cSld>
-  <p:clrMapOvr>
-    <a:masterClrMapping/>
-  </p:clrMapOvr>
-  <p:timing>
-    <p:tnLst>
-      <p:par>
-        <p:cTn id="1" dur="indefinite" restart="never" nodeType="tmRoot"/>
-      </p:par>
-    </p:tnLst>
-  </p:timing>
-</p:sld>
-</file>
-
 <file path=ppt/slides/slide2.xml><?xml version="1.0" encoding="utf-8"?>
 <p:sld xmlns:a="http://schemas.openxmlformats.org/drawingml/2006/main" xmlns:r="http://schemas.openxmlformats.org/officeDocument/2006/relationships" xmlns:p="http://schemas.openxmlformats.org/presentationml/2006/main">
   <p:cSld>
@@ -21946,6 +21766,57 @@
           <a:chExt cx="0" cy="0"/>
         </a:xfrm>
       </p:grpSpPr>
+      <p:sp>
+        <p:nvSpPr>
+          <p:cNvPr id="4" name="Rectangle 3"/>
+          <p:cNvSpPr/>
+          <p:nvPr/>
+        </p:nvSpPr>
+        <p:spPr>
+          <a:xfrm>
+            <a:off x="853440" y="4214949"/>
+            <a:ext cx="7897129" cy="1236617"/>
+          </a:xfrm>
+          <a:prstGeom prst="rect">
+            <a:avLst/>
+          </a:prstGeom>
+          <a:solidFill>
+            <a:schemeClr val="accent3">
+              <a:lumMod val="20000"/>
+              <a:lumOff val="80000"/>
+            </a:schemeClr>
+          </a:solidFill>
+          <a:ln w="28575">
+            <a:solidFill>
+              <a:schemeClr val="accent3"/>
+            </a:solidFill>
+          </a:ln>
+        </p:spPr>
+        <p:style>
+          <a:lnRef idx="2">
+            <a:schemeClr val="accent2">
+              <a:shade val="50000"/>
+            </a:schemeClr>
+          </a:lnRef>
+          <a:fillRef idx="1">
+            <a:schemeClr val="accent2"/>
+          </a:fillRef>
+          <a:effectRef idx="0">
+            <a:schemeClr val="accent2"/>
+          </a:effectRef>
+          <a:fontRef idx="minor">
+            <a:schemeClr val="lt1"/>
+          </a:fontRef>
+        </p:style>
+        <p:txBody>
+          <a:bodyPr rtlCol="0" anchor="ctr"/>
+          <a:lstStyle/>
+          <a:p>
+            <a:pPr algn="ctr"/>
+            <a:endParaRPr lang="en-US"/>
+          </a:p>
+        </p:txBody>
+      </p:sp>
       <p:sp>
         <p:nvSpPr>
           <p:cNvPr id="2" name="Title 1"/>
@@ -22051,7 +21922,6 @@
               <a:rPr lang="en-US" sz="2000" dirty="0"/>
               <a:t>so we can understand the overlap between the service providers and districts. Possible applications:</a:t>
             </a:r>
-            <a:endParaRPr lang="en-US" sz="2000" dirty="0"/>
           </a:p>
           <a:p>
             <a:pPr marL="0" indent="0">
@@ -22177,6 +22047,59 @@
           </a:p>
         </p:txBody>
       </p:sp>
+      <p:sp>
+        <p:nvSpPr>
+          <p:cNvPr id="6" name="Rectangle 5"/>
+          <p:cNvSpPr/>
+          <p:nvPr/>
+        </p:nvSpPr>
+        <p:spPr>
+          <a:xfrm>
+            <a:off x="2898277" y="5452899"/>
+            <a:ext cx="3807453" cy="369332"/>
+          </a:xfrm>
+          <a:prstGeom prst="rect">
+            <a:avLst/>
+          </a:prstGeom>
+        </p:spPr>
+        <p:txBody>
+          <a:bodyPr wrap="none">
+            <a:spAutoFit/>
+          </a:bodyPr>
+          <a:lstStyle/>
+          <a:p>
+            <a:r>
+              <a:rPr lang="en-US" dirty="0" smtClean="0">
+                <a:solidFill>
+                  <a:schemeClr val="accent3"/>
+                </a:solidFill>
+              </a:rPr>
+              <a:t>Current </a:t>
+            </a:r>
+            <a:r>
+              <a:rPr lang="en-US" smtClean="0">
+                <a:solidFill>
+                  <a:schemeClr val="accent3"/>
+                </a:solidFill>
+              </a:rPr>
+              <a:t>analysis starts to addresses </a:t>
+            </a:r>
+            <a:r>
+              <a:rPr lang="en-US" dirty="0" smtClean="0">
+                <a:solidFill>
+                  <a:schemeClr val="accent3"/>
+                </a:solidFill>
+              </a:rPr>
+              <a:t>this</a:t>
+            </a:r>
+            <a:endParaRPr lang="en-US" dirty="0">
+              <a:solidFill>
+                <a:schemeClr val="accent3"/>
+              </a:solidFill>
+            </a:endParaRPr>
+          </a:p>
+        </p:txBody>
+      </p:sp>
     </p:spTree>
     <p:extLst>
       <p:ext uri="{BB962C8B-B14F-4D97-AF65-F5344CB8AC3E}">
@@ -22226,189 +22149,10 @@
         </p:nvSpPr>
         <p:spPr>
           <a:xfrm>
-            <a:off x="425002" y="379132"/>
-            <a:ext cx="8464997" cy="410223"/>
-          </a:xfrm>
-        </p:spPr>
-        <p:txBody>
-          <a:bodyPr/>
-          <a:lstStyle/>
-          <a:p>
-            <a:r>
-              <a:rPr lang="en-US" dirty="0" smtClean="0"/>
-              <a:t>Methodology</a:t>
-            </a:r>
-            <a:endParaRPr lang="en-US" dirty="0"/>
-          </a:p>
-        </p:txBody>
-      </p:sp>
-      <p:sp>
-        <p:nvSpPr>
-          <p:cNvPr id="3" name="Rectangle 2"/>
-          <p:cNvSpPr/>
-          <p:nvPr/>
-        </p:nvSpPr>
-        <p:spPr>
-          <a:xfrm>
-            <a:off x="425003" y="1233250"/>
-            <a:ext cx="8177130" cy="4693593"/>
-          </a:xfrm>
-          <a:prstGeom prst="rect">
-            <a:avLst/>
-          </a:prstGeom>
-        </p:spPr>
-        <p:txBody>
-          <a:bodyPr wrap="square">
-            <a:spAutoFit/>
-          </a:bodyPr>
-          <a:lstStyle/>
-          <a:p>
-            <a:pPr marL="342900" indent="-342900">
-              <a:buFont typeface="Arial"/>
-              <a:buChar char="•"/>
-            </a:pPr>
-            <a:r>
-              <a:rPr lang="en-US" sz="2000" dirty="0" smtClean="0"/>
-              <a:t>Considered all schools and districts in our universe of districts for this analysis</a:t>
-            </a:r>
-          </a:p>
-          <a:p>
-            <a:pPr marL="342900" indent="-342900">
-              <a:buFont typeface="Arial"/>
-              <a:buChar char="•"/>
-            </a:pPr>
-            <a:endParaRPr lang="en-US" sz="2000" dirty="0" smtClean="0"/>
-          </a:p>
-          <a:p>
-            <a:pPr marL="342900" indent="-342900">
-              <a:buFont typeface="Arial"/>
-              <a:buChar char="•"/>
-            </a:pPr>
-            <a:r>
-              <a:rPr lang="en-US" sz="2000" dirty="0" smtClean="0"/>
-              <a:t>Census blocks were linked to schools and districts via latitude and longitude coordinates</a:t>
-            </a:r>
-          </a:p>
-          <a:p>
-            <a:pPr marL="800100" lvl="1" indent="-342900">
-              <a:buFont typeface="Arial"/>
-              <a:buChar char="•"/>
-            </a:pPr>
-            <a:r>
-              <a:rPr lang="en-US" sz="1700" dirty="0" smtClean="0"/>
-              <a:t>Although it’s possible for schools and districts to lie on the boundary of multiple census blocks, none of the districts in our universe met this condition </a:t>
-            </a:r>
-            <a:r>
-              <a:rPr lang="mr-IN" sz="1700" dirty="0" smtClean="0"/>
-              <a:t>–</a:t>
-            </a:r>
-            <a:r>
-              <a:rPr lang="en-US" sz="1700" dirty="0" smtClean="0"/>
-              <a:t> i.e., each district was assigned to a unique block</a:t>
-            </a:r>
-            <a:endParaRPr lang="en-US" sz="1700" dirty="0" smtClean="0"/>
-          </a:p>
-          <a:p>
-            <a:pPr marL="342900" indent="-342900">
-              <a:buFont typeface="Arial"/>
-              <a:buChar char="•"/>
-            </a:pPr>
-            <a:endParaRPr lang="en-US" sz="2000" dirty="0"/>
-          </a:p>
-          <a:p>
-            <a:pPr marL="342900" indent="-342900">
-              <a:buFont typeface="Arial"/>
-              <a:buChar char="•"/>
-            </a:pPr>
-            <a:r>
-              <a:rPr lang="en-US" sz="2000" dirty="0" smtClean="0"/>
-              <a:t>Distinct service providers within the Form 477 data were identified via their ‘Holding Company Name’ </a:t>
-            </a:r>
-            <a:r>
-              <a:rPr lang="en-US" sz="2000" dirty="0"/>
-              <a:t>(as filed on Form 477)</a:t>
-            </a:r>
-            <a:r>
-              <a:rPr lang="en-US" sz="2000" dirty="0" smtClean="0"/>
-              <a:t> </a:t>
-            </a:r>
-          </a:p>
-          <a:p>
-            <a:pPr marL="800100" lvl="1" indent="-342900">
-              <a:buFont typeface="Arial"/>
-              <a:buChar char="•"/>
-            </a:pPr>
-            <a:r>
-              <a:rPr lang="en-US" sz="1700" dirty="0" smtClean="0"/>
-              <a:t>This was decided because there were the </a:t>
-            </a:r>
-            <a:r>
-              <a:rPr lang="en-US" sz="1700" i="1" dirty="0" smtClean="0"/>
-              <a:t>least</a:t>
-            </a:r>
-            <a:r>
-              <a:rPr lang="en-US" sz="1700" dirty="0" smtClean="0"/>
-              <a:t> amount of distinct Holding Company Names compared to other service provider name columns, and we want to be conservative and not overestimate the amount of service providers in a census block</a:t>
-            </a:r>
-            <a:endParaRPr lang="en-US" sz="1700" dirty="0"/>
-          </a:p>
-          <a:p>
-            <a:pPr marL="342900" indent="-342900">
-              <a:buFont typeface="Arial"/>
-              <a:buChar char="•"/>
-            </a:pPr>
-            <a:endParaRPr lang="en-US" sz="2000" i="1" dirty="0" smtClean="0"/>
-          </a:p>
-        </p:txBody>
-      </p:sp>
-    </p:spTree>
-    <p:extLst>
-      <p:ext uri="{BB962C8B-B14F-4D97-AF65-F5344CB8AC3E}">
-        <p14:creationId xmlns:p14="http://schemas.microsoft.com/office/powerpoint/2010/main" val="64273612"/>
-      </p:ext>
-    </p:extLst>
-  </p:cSld>
-  <p:clrMapOvr>
-    <a:masterClrMapping/>
-  </p:clrMapOvr>
-  <p:timing>
-    <p:tnLst>
-      <p:par>
-        <p:cTn id="1" dur="indefinite" restart="never" nodeType="tmRoot"/>
-      </p:par>
-    </p:tnLst>
-  </p:timing>
-</p:sld>
-</file>
-
-<file path=ppt/slides/slide4.xml><?xml version="1.0" encoding="utf-8"?>
-<p:sld xmlns:a="http://schemas.openxmlformats.org/drawingml/2006/main" xmlns:r="http://schemas.openxmlformats.org/officeDocument/2006/relationships" xmlns:p="http://schemas.openxmlformats.org/presentationml/2006/main">
-  <p:cSld>
-    <p:spTree>
-      <p:nvGrpSpPr>
-        <p:cNvPr id="1" name=""/>
-        <p:cNvGrpSpPr/>
-        <p:nvPr/>
-      </p:nvGrpSpPr>
-      <p:grpSpPr>
-        <a:xfrm>
-          <a:off x="0" y="0"/>
-          <a:ext cx="0" cy="0"/>
-          <a:chOff x="0" y="0"/>
-          <a:chExt cx="0" cy="0"/>
-        </a:xfrm>
-      </p:grpSpPr>
-      <p:sp>
-        <p:nvSpPr>
-          <p:cNvPr id="2" name="Title 1"/>
-          <p:cNvSpPr>
-            <a:spLocks noGrp="1"/>
-          </p:cNvSpPr>
-          <p:nvPr>
-            <p:ph type="title"/>
-          </p:nvPr>
-        </p:nvSpPr>
-        <p:spPr/>
+            <a:off x="218394" y="277532"/>
+            <a:ext cx="8533719" cy="410223"/>
+          </a:xfrm>
+        </p:spPr>
         <p:txBody>
           <a:bodyPr/>
           <a:lstStyle/>
@@ -22422,7 +22166,18 @@
                 <a:cs typeface="Arial"/>
                 <a:sym typeface="Arial"/>
               </a:rPr>
-              <a:t>Key Stats</a:t>
+              <a:t>There is a one-to-one mapping between our districts</a:t>
+            </a:r>
+            <a:r>
+              <a:rPr lang="en-US" smtClean="0">
+                <a:solidFill>
+                  <a:schemeClr val="dk1"/>
+                </a:solidFill>
+                <a:ea typeface="Arial"/>
+                <a:cs typeface="Arial"/>
+                <a:sym typeface="Arial"/>
+              </a:rPr>
+              <a:t>’ locations and census blocks </a:t>
             </a:r>
             <a:endParaRPr lang="en-US" dirty="0"/>
           </a:p>
@@ -22511,15 +22266,6 @@
               </a:rPr>
               <a:t>represented 	           among our universe of 	           13,608 school districts </a:t>
             </a:r>
-            <a:endParaRPr lang="en-US" sz="1800" b="0" i="0" u="none" strike="noStrike" cap="none" dirty="0" smtClean="0">
-              <a:solidFill>
-                <a:schemeClr val="dk1"/>
-              </a:solidFill>
-              <a:latin typeface="Lato"/>
-              <a:ea typeface="Lato"/>
-              <a:cs typeface="Lato"/>
-              <a:sym typeface="Lato"/>
-            </a:endParaRPr>
           </a:p>
           <a:p>
             <a:pPr marL="0" marR="0" lvl="0" indent="0" algn="l" rtl="0">
@@ -22615,15 +22361,6 @@
               </a:rPr>
               <a:t> per census block 	          on average</a:t>
             </a:r>
-            <a:endParaRPr lang="en-US" sz="1800" b="0" i="0" u="none" strike="noStrike" cap="none" dirty="0" smtClean="0">
-              <a:solidFill>
-                <a:schemeClr val="dk1"/>
-              </a:solidFill>
-              <a:latin typeface="Lato"/>
-              <a:ea typeface="Lato"/>
-              <a:cs typeface="Lato"/>
-              <a:sym typeface="Lato"/>
-            </a:endParaRPr>
           </a:p>
           <a:p>
             <a:pPr marL="0" marR="0" lvl="0" indent="0" algn="l" rtl="0">
@@ -22696,15 +22433,6 @@
               </a:rPr>
               <a:t>to a block 	         on average</a:t>
             </a:r>
-            <a:endParaRPr lang="en-US" sz="1800" b="0" i="0" u="none" strike="noStrike" cap="none" dirty="0" smtClean="0">
-              <a:solidFill>
-                <a:schemeClr val="dk1"/>
-              </a:solidFill>
-              <a:latin typeface="Lato"/>
-              <a:ea typeface="Lato"/>
-              <a:cs typeface="Lato"/>
-              <a:sym typeface="Lato"/>
-            </a:endParaRPr>
           </a:p>
           <a:p>
             <a:pPr marL="0" marR="0" lvl="0" indent="0" algn="l" rtl="0">
@@ -22899,6 +22627,860 @@
 </p:sld>
 </file>
 
+<file path=ppt/slides/slide4.xml><?xml version="1.0" encoding="utf-8"?>
+<p:sld xmlns:a="http://schemas.openxmlformats.org/drawingml/2006/main" xmlns:r="http://schemas.openxmlformats.org/officeDocument/2006/relationships" xmlns:p="http://schemas.openxmlformats.org/presentationml/2006/main">
+  <p:cSld>
+    <p:spTree>
+      <p:nvGrpSpPr>
+        <p:cNvPr id="1" name=""/>
+        <p:cNvGrpSpPr/>
+        <p:nvPr/>
+      </p:nvGrpSpPr>
+      <p:grpSpPr>
+        <a:xfrm>
+          <a:off x="0" y="0"/>
+          <a:ext cx="0" cy="0"/>
+          <a:chOff x="0" y="0"/>
+          <a:chExt cx="0" cy="0"/>
+        </a:xfrm>
+      </p:grpSpPr>
+      <p:sp>
+        <p:nvSpPr>
+          <p:cNvPr id="4" name="Rectangle 3"/>
+          <p:cNvSpPr/>
+          <p:nvPr/>
+        </p:nvSpPr>
+        <p:spPr>
+          <a:xfrm>
+            <a:off x="5321301" y="916527"/>
+            <a:ext cx="3784599" cy="3323987"/>
+          </a:xfrm>
+          <a:prstGeom prst="rect">
+            <a:avLst/>
+          </a:prstGeom>
+        </p:spPr>
+        <p:txBody>
+          <a:bodyPr wrap="square">
+            <a:spAutoFit/>
+          </a:bodyPr>
+          <a:lstStyle/>
+          <a:p>
+            <a:pPr marL="342900" indent="-342900">
+              <a:buFont typeface="+mj-lt"/>
+              <a:buAutoNum type="arabicPeriod"/>
+            </a:pPr>
+            <a:r>
+              <a:rPr lang="en-US" sz="1400" b="1" dirty="0"/>
+              <a:t>Hypothesis: </a:t>
+            </a:r>
+            <a:r>
+              <a:rPr lang="en-US" sz="1400" dirty="0"/>
+              <a:t>most of the F</a:t>
+            </a:r>
+            <a:r>
+              <a:rPr lang="en-US" sz="1400" dirty="0" smtClean="0"/>
+              <a:t>iber Targets </a:t>
+            </a:r>
+            <a:r>
+              <a:rPr lang="en-US" sz="1400" dirty="0"/>
+              <a:t>are in locations where there is </a:t>
+            </a:r>
+            <a:r>
+              <a:rPr lang="en-US" sz="1400" u="sng" dirty="0"/>
+              <a:t>only one or </a:t>
+            </a:r>
+            <a:r>
+              <a:rPr lang="en-US" sz="1400" u="sng" dirty="0" smtClean="0"/>
+              <a:t>no </a:t>
+            </a:r>
+            <a:r>
+              <a:rPr lang="en-US" sz="1400" u="sng" dirty="0"/>
+              <a:t>service providers</a:t>
+            </a:r>
+            <a:r>
+              <a:rPr lang="en-US" sz="1400" dirty="0"/>
+              <a:t> with speeds sufficient enough for 1 </a:t>
+            </a:r>
+            <a:r>
+              <a:rPr lang="en-US" sz="1400" dirty="0" smtClean="0"/>
+              <a:t>Mbps/student. Based on the distributions displayed here, this is </a:t>
+            </a:r>
+            <a:r>
+              <a:rPr lang="en-US" sz="1400" u="sng" dirty="0" smtClean="0"/>
+              <a:t>disproven</a:t>
+            </a:r>
+          </a:p>
+          <a:p>
+            <a:pPr marL="342900" indent="-342900">
+              <a:buFont typeface="+mj-lt"/>
+              <a:buAutoNum type="arabicPeriod"/>
+            </a:pPr>
+            <a:endParaRPr lang="en-US" sz="1400" dirty="0" smtClean="0"/>
+          </a:p>
+          <a:p>
+            <a:pPr marL="342900" indent="-342900">
+              <a:buFont typeface="+mj-lt"/>
+              <a:buAutoNum type="arabicPeriod"/>
+            </a:pPr>
+            <a:endParaRPr lang="en-US" sz="1400" dirty="0" smtClean="0"/>
+          </a:p>
+          <a:p>
+            <a:pPr marL="342900" indent="-342900">
+              <a:buFont typeface="+mj-lt"/>
+              <a:buAutoNum type="arabicPeriod"/>
+            </a:pPr>
+            <a:r>
+              <a:rPr lang="en-US" sz="1400" b="1" dirty="0" smtClean="0"/>
+              <a:t>Additional Finding: </a:t>
+            </a:r>
+            <a:r>
+              <a:rPr lang="en-US" sz="1400" dirty="0" smtClean="0"/>
+              <a:t>Fiber Targets have less service providers per census block on average than Not Fiber Targets</a:t>
+            </a:r>
+            <a:r>
+              <a:rPr lang="en-US" sz="1400" baseline="30000" dirty="0" smtClean="0"/>
+              <a:t>1</a:t>
+            </a:r>
+            <a:endParaRPr lang="en-US" sz="1400" dirty="0"/>
+          </a:p>
+          <a:p>
+            <a:pPr marL="742950" lvl="1" indent="-285750">
+              <a:buFont typeface="Arial" charset="0"/>
+              <a:buChar char="•"/>
+            </a:pPr>
+            <a:r>
+              <a:rPr lang="en-US" sz="1400" dirty="0" smtClean="0"/>
+              <a:t>Fiber Targets are 2.2x as likely to have 4 service providers or less in their census block (5.2% vs. 2.3%)</a:t>
+            </a:r>
+            <a:endParaRPr lang="en-US" sz="1400" dirty="0" smtClean="0"/>
+          </a:p>
+          <a:p>
+            <a:pPr marL="342900" indent="-342900">
+              <a:buFont typeface="Arial"/>
+              <a:buChar char="•"/>
+            </a:pPr>
+            <a:endParaRPr lang="en-US" sz="1400" dirty="0" smtClean="0"/>
+          </a:p>
+          <a:p>
+            <a:pPr marL="342900" indent="-342900">
+              <a:buFont typeface="Arial"/>
+              <a:buChar char="•"/>
+            </a:pPr>
+            <a:endParaRPr lang="en-US" sz="1400" i="1" dirty="0" smtClean="0"/>
+          </a:p>
+        </p:txBody>
+      </p:sp>
+      <p:sp>
+        <p:nvSpPr>
+          <p:cNvPr id="6" name="Rectangle 5"/>
+          <p:cNvSpPr/>
+          <p:nvPr/>
+        </p:nvSpPr>
+        <p:spPr>
+          <a:xfrm>
+            <a:off x="5560873" y="4150553"/>
+            <a:ext cx="3226076" cy="430887"/>
+          </a:xfrm>
+          <a:prstGeom prst="rect">
+            <a:avLst/>
+          </a:prstGeom>
+        </p:spPr>
+        <p:txBody>
+          <a:bodyPr wrap="square">
+            <a:spAutoFit/>
+          </a:bodyPr>
+          <a:lstStyle/>
+          <a:p>
+            <a:r>
+              <a:rPr lang="en-US" sz="1100" baseline="30000" dirty="0" smtClean="0"/>
+              <a:t>1</a:t>
+            </a:r>
+            <a:r>
+              <a:rPr lang="en-US" sz="1100" dirty="0" smtClean="0"/>
+              <a:t>and </a:t>
+            </a:r>
+            <a:r>
+              <a:rPr lang="en-US" sz="1100" dirty="0"/>
+              <a:t>significantly less according to a one-sided t-test, p-value = </a:t>
+            </a:r>
+            <a:r>
+              <a:rPr lang="en-US" sz="1100" dirty="0" smtClean="0"/>
+              <a:t>3</a:t>
+            </a:r>
+            <a:r>
+              <a:rPr lang="mr-IN" sz="1100" dirty="0" smtClean="0"/>
+              <a:t>.22e-06</a:t>
+            </a:r>
+            <a:endParaRPr lang="en-US" sz="1100" dirty="0"/>
+          </a:p>
+        </p:txBody>
+      </p:sp>
+      <p:sp>
+        <p:nvSpPr>
+          <p:cNvPr id="7" name="Title 1"/>
+          <p:cNvSpPr>
+            <a:spLocks noGrp="1"/>
+          </p:cNvSpPr>
+          <p:nvPr>
+            <p:ph type="title"/>
+          </p:nvPr>
+        </p:nvSpPr>
+        <p:spPr>
+          <a:xfrm>
+            <a:off x="121926" y="168568"/>
+            <a:ext cx="8786949" cy="410223"/>
+          </a:xfrm>
+        </p:spPr>
+        <p:txBody>
+          <a:bodyPr/>
+          <a:lstStyle/>
+          <a:p>
+            <a:r>
+              <a:rPr lang="en-US" sz="1900"/>
+              <a:t>Fiber Targets are 2.2x as likely to have 4 service providers or less in their census block</a:t>
+            </a:r>
+            <a:endParaRPr lang="en-US" sz="1900" dirty="0"/>
+          </a:p>
+        </p:txBody>
+      </p:sp>
+      <p:sp>
+        <p:nvSpPr>
+          <p:cNvPr id="2" name="Rectangle 1"/>
+          <p:cNvSpPr/>
+          <p:nvPr/>
+        </p:nvSpPr>
+        <p:spPr>
+          <a:xfrm>
+            <a:off x="304801" y="5078195"/>
+            <a:ext cx="8482148" cy="1323439"/>
+          </a:xfrm>
+          <a:prstGeom prst="rect">
+            <a:avLst/>
+          </a:prstGeom>
+        </p:spPr>
+        <p:txBody>
+          <a:bodyPr wrap="square">
+            <a:spAutoFit/>
+          </a:bodyPr>
+          <a:lstStyle/>
+          <a:p>
+            <a:r>
+              <a:rPr lang="en-US" sz="1600" b="1" dirty="0" smtClean="0"/>
+              <a:t>3. Recommendations:</a:t>
+            </a:r>
+            <a:r>
+              <a:rPr lang="en-US" sz="1600" dirty="0" smtClean="0"/>
+              <a:t> </a:t>
+            </a:r>
+          </a:p>
+          <a:p>
+            <a:pPr marL="285750" indent="-285750">
+              <a:buFont typeface="Arial" charset="0"/>
+              <a:buChar char="•"/>
+            </a:pPr>
+            <a:r>
+              <a:rPr lang="en-US" sz="1600" dirty="0" smtClean="0"/>
+              <a:t>Since </a:t>
+            </a:r>
+            <a:r>
+              <a:rPr lang="en-US" sz="1600" dirty="0"/>
+              <a:t>there are more service providers per Fiber Target census block than </a:t>
+            </a:r>
+            <a:r>
+              <a:rPr lang="en-US" sz="1600" dirty="0" smtClean="0"/>
+              <a:t>anticipated, we </a:t>
+            </a:r>
+            <a:r>
+              <a:rPr lang="en-US" sz="1600" dirty="0"/>
+              <a:t>should further explore these providers and understand/quantify their ability to serve school </a:t>
+            </a:r>
+            <a:r>
+              <a:rPr lang="en-US" sz="1600" dirty="0" smtClean="0"/>
+              <a:t>districts</a:t>
+            </a:r>
+          </a:p>
+          <a:p>
+            <a:pPr marL="285750" indent="-285750">
+              <a:buFont typeface="Arial" charset="0"/>
+              <a:buChar char="•"/>
+            </a:pPr>
+            <a:r>
+              <a:rPr lang="en-US" sz="1600" dirty="0" smtClean="0"/>
+              <a:t>Due to the possibility of the Form 477 service provider list being inflated, this strengthens the impact of our additional finding</a:t>
+            </a:r>
+            <a:endParaRPr lang="en-US" sz="1600" b="1" dirty="0"/>
+          </a:p>
+        </p:txBody>
+      </p:sp>
+      <p:sp>
+        <p:nvSpPr>
+          <p:cNvPr id="8" name="Rectangle 7"/>
+          <p:cNvSpPr/>
+          <p:nvPr/>
+        </p:nvSpPr>
+        <p:spPr>
+          <a:xfrm>
+            <a:off x="0" y="4950829"/>
+            <a:ext cx="9144000" cy="60088"/>
+          </a:xfrm>
+          <a:prstGeom prst="rect">
+            <a:avLst/>
+          </a:prstGeom>
+          <a:solidFill>
+            <a:srgbClr val="FDB913"/>
+          </a:solidFill>
+          <a:ln w="12700" cap="flat" cmpd="sng" algn="ctr">
+            <a:noFill/>
+            <a:prstDash val="solid"/>
+            <a:miter lim="800000"/>
+          </a:ln>
+          <a:effectLst/>
+        </p:spPr>
+        <p:txBody>
+          <a:bodyPr rtlCol="0" anchor="ctr"/>
+          <a:lstStyle/>
+          <a:p>
+            <a:pPr marL="0" marR="0" lvl="0" indent="0" algn="ctr" defTabSz="914400" eaLnBrk="1" fontAlgn="auto" latinLnBrk="0" hangingPunct="1">
+              <a:lnSpc>
+                <a:spcPct val="100000"/>
+              </a:lnSpc>
+              <a:spcBef>
+                <a:spcPts val="0"/>
+              </a:spcBef>
+              <a:spcAft>
+                <a:spcPts val="0"/>
+              </a:spcAft>
+              <a:buClrTx/>
+              <a:buSzTx/>
+              <a:buFontTx/>
+              <a:buNone/>
+              <a:tabLst/>
+              <a:defRPr/>
+            </a:pPr>
+            <a:endParaRPr kumimoji="0" lang="en-US" sz="1800" b="0" i="0" u="none" strike="noStrike" kern="0" cap="none" spc="0" normalizeH="0" baseline="0" noProof="0" dirty="0" smtClean="0">
+              <a:ln>
+                <a:noFill/>
+              </a:ln>
+              <a:solidFill>
+                <a:prstClr val="white"/>
+              </a:solidFill>
+              <a:effectLst/>
+              <a:uLnTx/>
+              <a:uFillTx/>
+              <a:latin typeface="Calibri"/>
+              <a:ea typeface="+mn-ea"/>
+              <a:cs typeface="+mn-cs"/>
+            </a:endParaRPr>
+          </a:p>
+        </p:txBody>
+      </p:sp>
+      <p:pic>
+        <p:nvPicPr>
+          <p:cNvPr id="3" name="Picture 2"/>
+          <p:cNvPicPr>
+            <a:picLocks noChangeAspect="1"/>
+          </p:cNvPicPr>
+          <p:nvPr/>
+        </p:nvPicPr>
+        <p:blipFill>
+          <a:blip r:embed="rId2">
+            <a:extLst>
+              <a:ext uri="{28A0092B-C50C-407E-A947-70E740481C1C}">
+                <a14:useLocalDpi xmlns:a14="http://schemas.microsoft.com/office/drawing/2010/main" val="0"/>
+              </a:ext>
+            </a:extLst>
+          </a:blip>
+          <a:stretch>
+            <a:fillRect/>
+          </a:stretch>
+        </p:blipFill>
+        <p:spPr>
+          <a:xfrm>
+            <a:off x="0" y="767994"/>
+            <a:ext cx="5321301" cy="3830136"/>
+          </a:xfrm>
+          <a:prstGeom prst="rect">
+            <a:avLst/>
+          </a:prstGeom>
+        </p:spPr>
+      </p:pic>
+      <p:sp>
+        <p:nvSpPr>
+          <p:cNvPr id="9" name="Left Brace 8"/>
+          <p:cNvSpPr/>
+          <p:nvPr/>
+        </p:nvSpPr>
+        <p:spPr>
+          <a:xfrm rot="5400000">
+            <a:off x="1423490" y="3143800"/>
+            <a:ext cx="226423" cy="1367246"/>
+          </a:xfrm>
+          <a:prstGeom prst="leftBrace">
+            <a:avLst/>
+          </a:prstGeom>
+          <a:ln>
+            <a:solidFill>
+              <a:schemeClr val="accent6"/>
+            </a:solidFill>
+          </a:ln>
+        </p:spPr>
+        <p:style>
+          <a:lnRef idx="1">
+            <a:schemeClr val="accent1"/>
+          </a:lnRef>
+          <a:fillRef idx="0">
+            <a:schemeClr val="accent1"/>
+          </a:fillRef>
+          <a:effectRef idx="0">
+            <a:schemeClr val="accent1"/>
+          </a:effectRef>
+          <a:fontRef idx="minor">
+            <a:schemeClr val="tx1"/>
+          </a:fontRef>
+        </p:style>
+        <p:txBody>
+          <a:bodyPr rtlCol="0" anchor="ctr"/>
+          <a:lstStyle/>
+          <a:p>
+            <a:pPr algn="ctr"/>
+            <a:endParaRPr lang="en-US"/>
+          </a:p>
+        </p:txBody>
+      </p:sp>
+      <p:sp>
+        <p:nvSpPr>
+          <p:cNvPr id="10" name="TextBox 9"/>
+          <p:cNvSpPr txBox="1"/>
+          <p:nvPr/>
+        </p:nvSpPr>
+        <p:spPr>
+          <a:xfrm>
+            <a:off x="1010924" y="3478891"/>
+            <a:ext cx="1123042" cy="292388"/>
+          </a:xfrm>
+          <a:prstGeom prst="rect">
+            <a:avLst/>
+          </a:prstGeom>
+          <a:noFill/>
+        </p:spPr>
+        <p:txBody>
+          <a:bodyPr wrap="square" rtlCol="0">
+            <a:spAutoFit/>
+          </a:bodyPr>
+          <a:lstStyle/>
+          <a:p>
+            <a:r>
+              <a:rPr lang="en-US" sz="1300" b="1" smtClean="0">
+                <a:solidFill>
+                  <a:schemeClr val="accent6"/>
+                </a:solidFill>
+              </a:rPr>
+              <a:t>5% Targets</a:t>
+            </a:r>
+            <a:endParaRPr lang="en-US" sz="1300" b="1" dirty="0">
+              <a:solidFill>
+                <a:schemeClr val="accent6"/>
+              </a:solidFill>
+            </a:endParaRPr>
+          </a:p>
+        </p:txBody>
+      </p:sp>
+      <p:sp>
+        <p:nvSpPr>
+          <p:cNvPr id="11" name="Left Brace 10"/>
+          <p:cNvSpPr/>
+          <p:nvPr/>
+        </p:nvSpPr>
+        <p:spPr>
+          <a:xfrm rot="5400000">
+            <a:off x="1680901" y="2314667"/>
+            <a:ext cx="199641" cy="1855287"/>
+          </a:xfrm>
+          <a:prstGeom prst="leftBrace">
+            <a:avLst/>
+          </a:prstGeom>
+          <a:ln>
+            <a:solidFill>
+              <a:schemeClr val="accent6"/>
+            </a:solidFill>
+          </a:ln>
+        </p:spPr>
+        <p:style>
+          <a:lnRef idx="1">
+            <a:schemeClr val="accent1"/>
+          </a:lnRef>
+          <a:fillRef idx="0">
+            <a:schemeClr val="accent1"/>
+          </a:fillRef>
+          <a:effectRef idx="0">
+            <a:schemeClr val="accent1"/>
+          </a:effectRef>
+          <a:fontRef idx="minor">
+            <a:schemeClr val="tx1"/>
+          </a:fontRef>
+        </p:style>
+        <p:txBody>
+          <a:bodyPr rtlCol="0" anchor="ctr"/>
+          <a:lstStyle/>
+          <a:p>
+            <a:pPr algn="ctr"/>
+            <a:endParaRPr lang="en-US"/>
+          </a:p>
+        </p:txBody>
+      </p:sp>
+      <p:sp>
+        <p:nvSpPr>
+          <p:cNvPr id="12" name="TextBox 11"/>
+          <p:cNvSpPr txBox="1"/>
+          <p:nvPr/>
+        </p:nvSpPr>
+        <p:spPr>
+          <a:xfrm>
+            <a:off x="975180" y="3787576"/>
+            <a:ext cx="1040941" cy="261610"/>
+          </a:xfrm>
+          <a:prstGeom prst="rect">
+            <a:avLst/>
+          </a:prstGeom>
+          <a:noFill/>
+        </p:spPr>
+        <p:txBody>
+          <a:bodyPr wrap="square" rtlCol="0">
+            <a:spAutoFit/>
+          </a:bodyPr>
+          <a:lstStyle/>
+          <a:p>
+            <a:pPr algn="ctr"/>
+            <a:r>
+              <a:rPr lang="en-US" sz="1100" dirty="0" smtClean="0">
+                <a:solidFill>
+                  <a:schemeClr val="accent6"/>
+                </a:solidFill>
+              </a:rPr>
+              <a:t>&lt;= </a:t>
+            </a:r>
+            <a:r>
+              <a:rPr lang="en-US" sz="1100" smtClean="0">
+                <a:solidFill>
+                  <a:schemeClr val="accent6"/>
+                </a:solidFill>
+              </a:rPr>
+              <a:t>4 providers</a:t>
+            </a:r>
+            <a:endParaRPr lang="en-US" sz="1100" dirty="0">
+              <a:solidFill>
+                <a:schemeClr val="accent6"/>
+              </a:solidFill>
+            </a:endParaRPr>
+          </a:p>
+        </p:txBody>
+      </p:sp>
+      <p:sp>
+        <p:nvSpPr>
+          <p:cNvPr id="13" name="TextBox 12"/>
+          <p:cNvSpPr txBox="1"/>
+          <p:nvPr/>
+        </p:nvSpPr>
+        <p:spPr>
+          <a:xfrm>
+            <a:off x="1204005" y="2908778"/>
+            <a:ext cx="1112477" cy="292388"/>
+          </a:xfrm>
+          <a:prstGeom prst="rect">
+            <a:avLst/>
+          </a:prstGeom>
+          <a:noFill/>
+        </p:spPr>
+        <p:txBody>
+          <a:bodyPr wrap="square" rtlCol="0">
+            <a:spAutoFit/>
+          </a:bodyPr>
+          <a:lstStyle/>
+          <a:p>
+            <a:r>
+              <a:rPr lang="en-US" sz="1300" b="1" dirty="0" smtClean="0">
+                <a:solidFill>
+                  <a:schemeClr val="accent6"/>
+                </a:solidFill>
+              </a:rPr>
+              <a:t>20% Targets</a:t>
+            </a:r>
+            <a:endParaRPr lang="en-US" sz="1300" b="1" dirty="0">
+              <a:solidFill>
+                <a:schemeClr val="accent6"/>
+              </a:solidFill>
+            </a:endParaRPr>
+          </a:p>
+        </p:txBody>
+      </p:sp>
+      <p:sp>
+        <p:nvSpPr>
+          <p:cNvPr id="14" name="TextBox 13"/>
+          <p:cNvSpPr txBox="1"/>
+          <p:nvPr/>
+        </p:nvSpPr>
+        <p:spPr>
+          <a:xfrm>
+            <a:off x="1169170" y="3209875"/>
+            <a:ext cx="1040941" cy="261610"/>
+          </a:xfrm>
+          <a:prstGeom prst="rect">
+            <a:avLst/>
+          </a:prstGeom>
+          <a:noFill/>
+        </p:spPr>
+        <p:txBody>
+          <a:bodyPr wrap="square" rtlCol="0">
+            <a:spAutoFit/>
+          </a:bodyPr>
+          <a:lstStyle/>
+          <a:p>
+            <a:pPr algn="ctr"/>
+            <a:r>
+              <a:rPr lang="en-US" sz="1100" dirty="0" smtClean="0">
+                <a:solidFill>
+                  <a:schemeClr val="accent6"/>
+                </a:solidFill>
+              </a:rPr>
+              <a:t>&lt;= 5 providers</a:t>
+            </a:r>
+            <a:endParaRPr lang="en-US" sz="1100" dirty="0">
+              <a:solidFill>
+                <a:schemeClr val="accent6"/>
+              </a:solidFill>
+            </a:endParaRPr>
+          </a:p>
+        </p:txBody>
+      </p:sp>
+      <p:sp>
+        <p:nvSpPr>
+          <p:cNvPr id="21" name="Left Brace 20"/>
+          <p:cNvSpPr/>
+          <p:nvPr/>
+        </p:nvSpPr>
+        <p:spPr>
+          <a:xfrm rot="5400000">
+            <a:off x="1412289" y="1559272"/>
+            <a:ext cx="226423" cy="1367246"/>
+          </a:xfrm>
+          <a:prstGeom prst="leftBrace">
+            <a:avLst/>
+          </a:prstGeom>
+          <a:ln>
+            <a:solidFill>
+              <a:schemeClr val="tx1"/>
+            </a:solidFill>
+          </a:ln>
+        </p:spPr>
+        <p:style>
+          <a:lnRef idx="1">
+            <a:schemeClr val="accent1"/>
+          </a:lnRef>
+          <a:fillRef idx="0">
+            <a:schemeClr val="accent1"/>
+          </a:fillRef>
+          <a:effectRef idx="0">
+            <a:schemeClr val="accent1"/>
+          </a:effectRef>
+          <a:fontRef idx="minor">
+            <a:schemeClr val="tx1"/>
+          </a:fontRef>
+        </p:style>
+        <p:txBody>
+          <a:bodyPr rtlCol="0" anchor="ctr"/>
+          <a:lstStyle/>
+          <a:p>
+            <a:pPr algn="ctr"/>
+            <a:endParaRPr lang="en-US"/>
+          </a:p>
+        </p:txBody>
+      </p:sp>
+      <p:sp>
+        <p:nvSpPr>
+          <p:cNvPr id="22" name="TextBox 21"/>
+          <p:cNvSpPr txBox="1"/>
+          <p:nvPr/>
+        </p:nvSpPr>
+        <p:spPr>
+          <a:xfrm>
+            <a:off x="938762" y="1894363"/>
+            <a:ext cx="1305558" cy="292388"/>
+          </a:xfrm>
+          <a:prstGeom prst="rect">
+            <a:avLst/>
+          </a:prstGeom>
+          <a:noFill/>
+        </p:spPr>
+        <p:txBody>
+          <a:bodyPr wrap="square" rtlCol="0">
+            <a:spAutoFit/>
+          </a:bodyPr>
+          <a:lstStyle/>
+          <a:p>
+            <a:r>
+              <a:rPr lang="en-US" sz="1300" b="1" dirty="0"/>
+              <a:t>2</a:t>
+            </a:r>
+            <a:r>
+              <a:rPr lang="en-US" sz="1300" b="1" smtClean="0"/>
+              <a:t>% Not Targets</a:t>
+            </a:r>
+            <a:endParaRPr lang="en-US" sz="1300" b="1" dirty="0"/>
+          </a:p>
+        </p:txBody>
+      </p:sp>
+      <p:sp>
+        <p:nvSpPr>
+          <p:cNvPr id="23" name="Left Brace 22"/>
+          <p:cNvSpPr/>
+          <p:nvPr/>
+        </p:nvSpPr>
+        <p:spPr>
+          <a:xfrm rot="5400000">
+            <a:off x="1669700" y="730139"/>
+            <a:ext cx="199641" cy="1855287"/>
+          </a:xfrm>
+          <a:prstGeom prst="leftBrace">
+            <a:avLst/>
+          </a:prstGeom>
+          <a:ln>
+            <a:solidFill>
+              <a:schemeClr val="tx1"/>
+            </a:solidFill>
+          </a:ln>
+        </p:spPr>
+        <p:style>
+          <a:lnRef idx="1">
+            <a:schemeClr val="accent1"/>
+          </a:lnRef>
+          <a:fillRef idx="0">
+            <a:schemeClr val="accent1"/>
+          </a:fillRef>
+          <a:effectRef idx="0">
+            <a:schemeClr val="accent1"/>
+          </a:effectRef>
+          <a:fontRef idx="minor">
+            <a:schemeClr val="tx1"/>
+          </a:fontRef>
+        </p:style>
+        <p:txBody>
+          <a:bodyPr rtlCol="0" anchor="ctr"/>
+          <a:lstStyle/>
+          <a:p>
+            <a:pPr algn="ctr"/>
+            <a:endParaRPr lang="en-US"/>
+          </a:p>
+        </p:txBody>
+      </p:sp>
+      <p:sp>
+        <p:nvSpPr>
+          <p:cNvPr id="24" name="TextBox 23"/>
+          <p:cNvSpPr txBox="1"/>
+          <p:nvPr/>
+        </p:nvSpPr>
+        <p:spPr>
+          <a:xfrm>
+            <a:off x="963979" y="2203048"/>
+            <a:ext cx="1040941" cy="261610"/>
+          </a:xfrm>
+          <a:prstGeom prst="rect">
+            <a:avLst/>
+          </a:prstGeom>
+          <a:noFill/>
+        </p:spPr>
+        <p:txBody>
+          <a:bodyPr wrap="square" rtlCol="0">
+            <a:spAutoFit/>
+          </a:bodyPr>
+          <a:lstStyle/>
+          <a:p>
+            <a:pPr algn="ctr"/>
+            <a:r>
+              <a:rPr lang="en-US" sz="1100" dirty="0" smtClean="0"/>
+              <a:t>&lt;= </a:t>
+            </a:r>
+            <a:r>
+              <a:rPr lang="en-US" sz="1100" smtClean="0"/>
+              <a:t>4 providers</a:t>
+            </a:r>
+            <a:endParaRPr lang="en-US" sz="1100" dirty="0"/>
+          </a:p>
+        </p:txBody>
+      </p:sp>
+      <p:sp>
+        <p:nvSpPr>
+          <p:cNvPr id="25" name="TextBox 24"/>
+          <p:cNvSpPr txBox="1"/>
+          <p:nvPr/>
+        </p:nvSpPr>
+        <p:spPr>
+          <a:xfrm>
+            <a:off x="1070797" y="1324250"/>
+            <a:ext cx="1452203" cy="292388"/>
+          </a:xfrm>
+          <a:prstGeom prst="rect">
+            <a:avLst/>
+          </a:prstGeom>
+          <a:noFill/>
+        </p:spPr>
+        <p:txBody>
+          <a:bodyPr wrap="square" rtlCol="0">
+            <a:spAutoFit/>
+          </a:bodyPr>
+          <a:lstStyle/>
+          <a:p>
+            <a:r>
+              <a:rPr lang="en-US" sz="1300" b="1" dirty="0" smtClean="0"/>
+              <a:t>15% Not Targets</a:t>
+            </a:r>
+            <a:endParaRPr lang="en-US" sz="1300" b="1" dirty="0"/>
+          </a:p>
+        </p:txBody>
+      </p:sp>
+      <p:sp>
+        <p:nvSpPr>
+          <p:cNvPr id="26" name="TextBox 25"/>
+          <p:cNvSpPr txBox="1"/>
+          <p:nvPr/>
+        </p:nvSpPr>
+        <p:spPr>
+          <a:xfrm>
+            <a:off x="1157969" y="1625347"/>
+            <a:ext cx="1040941" cy="261610"/>
+          </a:xfrm>
+          <a:prstGeom prst="rect">
+            <a:avLst/>
+          </a:prstGeom>
+          <a:noFill/>
+        </p:spPr>
+        <p:txBody>
+          <a:bodyPr wrap="square" rtlCol="0">
+            <a:spAutoFit/>
+          </a:bodyPr>
+          <a:lstStyle/>
+          <a:p>
+            <a:pPr algn="ctr"/>
+            <a:r>
+              <a:rPr lang="en-US" sz="1100" dirty="0" smtClean="0"/>
+              <a:t>&lt;= 5 providers</a:t>
+            </a:r>
+            <a:endParaRPr lang="en-US" sz="1100" dirty="0"/>
+          </a:p>
+        </p:txBody>
+      </p:sp>
+    </p:spTree>
+    <p:extLst>
+      <p:ext uri="{BB962C8B-B14F-4D97-AF65-F5344CB8AC3E}">
+        <p14:creationId xmlns:p14="http://schemas.microsoft.com/office/powerpoint/2010/main" val="490907997"/>
+      </p:ext>
+    </p:extLst>
+  </p:cSld>
+  <p:clrMapOvr>
+    <a:masterClrMapping/>
+  </p:clrMapOvr>
+</p:sld>
+</file>
+
 <file path=ppt/slides/slide5.xml><?xml version="1.0" encoding="utf-8"?>
 <p:sld xmlns:a="http://schemas.openxmlformats.org/drawingml/2006/main" xmlns:r="http://schemas.openxmlformats.org/officeDocument/2006/relationships" xmlns:p="http://schemas.openxmlformats.org/presentationml/2006/main">
   <p:cSld>
@@ -22918,18 +23500,18 @@
       </p:grpSpPr>
       <p:sp>
         <p:nvSpPr>
-          <p:cNvPr id="2" name="Text Placeholder 1"/>
+          <p:cNvPr id="2" name="Title 1"/>
           <p:cNvSpPr>
             <a:spLocks noGrp="1"/>
           </p:cNvSpPr>
           <p:nvPr>
-            <p:ph type="body" sz="quarter" idx="10"/>
+            <p:ph type="title"/>
           </p:nvPr>
         </p:nvSpPr>
         <p:spPr>
           <a:xfrm>
-            <a:off x="965200" y="2032000"/>
-            <a:ext cx="7073900" cy="1955800"/>
+            <a:off x="425002" y="379132"/>
+            <a:ext cx="8464997" cy="410223"/>
           </a:xfrm>
         </p:spPr>
         <p:txBody>
@@ -22937,36 +23519,10 @@
           <a:lstStyle/>
           <a:p>
             <a:r>
-              <a:rPr lang="en-US" sz="3800" dirty="0"/>
-              <a:t>Distribution of </a:t>
+              <a:rPr lang="en-US" dirty="0" smtClean="0"/>
+              <a:t>References</a:t>
             </a:r>
-            <a:r>
-              <a:rPr lang="en-US" sz="3800" dirty="0" smtClean="0"/>
-              <a:t>the number of service </a:t>
-            </a:r>
-            <a:r>
-              <a:rPr lang="en-US" sz="3800" dirty="0"/>
-              <a:t>providers in a </a:t>
-            </a:r>
-            <a:r>
-              <a:rPr lang="en-US" sz="3800" dirty="0" smtClean="0"/>
-              <a:t>district’s census block </a:t>
-            </a:r>
-            <a:r>
-              <a:rPr lang="en-US" sz="3800" dirty="0"/>
-              <a:t>by </a:t>
-            </a:r>
-            <a:r>
-              <a:rPr lang="en-US" sz="3800" dirty="0" smtClean="0"/>
-              <a:t>Fiber Target Status</a:t>
-            </a:r>
-          </a:p>
-          <a:p>
-            <a:r>
-              <a:rPr lang="en-US" sz="2000" dirty="0" smtClean="0"/>
-              <a:t>(National Level)</a:t>
-            </a:r>
-            <a:endParaRPr lang="en-US" sz="2000" dirty="0"/>
+            <a:endParaRPr lang="en-US" dirty="0"/>
           </a:p>
         </p:txBody>
       </p:sp>
@@ -22978,8 +23534,8 @@
         </p:nvSpPr>
         <p:spPr>
           <a:xfrm>
-            <a:off x="0" y="5524838"/>
-            <a:ext cx="4965700" cy="892552"/>
+            <a:off x="425003" y="1233250"/>
+            <a:ext cx="8177130" cy="1631216"/>
           </a:xfrm>
           <a:prstGeom prst="rect">
             <a:avLst/>
@@ -22991,26 +23547,60 @@
           </a:bodyPr>
           <a:lstStyle/>
           <a:p>
+            <a:pPr marL="342900" indent="-342900">
+              <a:buFont typeface="Arial"/>
+              <a:buChar char="•"/>
+            </a:pPr>
+            <a:endParaRPr lang="en-US" sz="2000" dirty="0"/>
+          </a:p>
+          <a:p>
+            <a:pPr marL="342900" indent="-342900">
+              <a:buFont typeface="Arial"/>
+              <a:buChar char="•"/>
+            </a:pPr>
             <a:r>
-              <a:rPr lang="en-US" sz="1300" b="1" dirty="0">
-                <a:solidFill>
-                  <a:schemeClr val="accent2"/>
-                </a:solidFill>
+              <a:rPr lang="en-US" sz="2000" dirty="0" smtClean="0">
+                <a:hlinkClick r:id="rId3"/>
               </a:rPr>
-              <a:t>2. Developing a ‘marketplace indicator’:  </a:t>
+              <a:t>Form 477 Confluence Page</a:t>
+            </a:r>
+            <a:endParaRPr lang="en-US" sz="2000" dirty="0" smtClean="0"/>
+          </a:p>
+          <a:p>
+            <a:pPr marL="342900" indent="-342900">
+              <a:buFont typeface="Arial"/>
+              <a:buChar char="•"/>
+            </a:pPr>
+            <a:endParaRPr lang="en-US" sz="2000" dirty="0" smtClean="0"/>
+          </a:p>
+          <a:p>
+            <a:pPr marL="342900" indent="-342900">
+              <a:buFont typeface="Arial"/>
+              <a:buChar char="•"/>
+            </a:pPr>
+            <a:r>
+              <a:rPr lang="en-US" sz="2000" dirty="0">
+                <a:hlinkClick r:id="rId4"/>
+              </a:rPr>
+              <a:t>https://</a:t>
             </a:r>
             <a:r>
-              <a:rPr lang="en-US" sz="1300" dirty="0"/>
-              <a:t>Correlate our data about fiber and bandwidth targets and E-rate bids with the Form 477 data to develop a marketplace indicator that evaluates the need and opportunity for deploying broadband to unserved or underserved communities</a:t>
+              <a:rPr lang="en-US" sz="2000" dirty="0" smtClean="0">
+                <a:hlinkClick r:id="rId4"/>
+              </a:rPr>
+              <a:t>www2.census.gov/geo/pdfs/maps-data/data/tiger/tgrshp2016/TGRSHP2016_TechDoc.pdf</a:t>
             </a:r>
-            <a:endParaRPr lang="en-US" sz="1300" dirty="0"/>
+            <a:r>
+              <a:rPr lang="en-US" sz="2000" dirty="0" smtClean="0"/>
+              <a:t> </a:t>
+            </a:r>
           </a:p>
         </p:txBody>
       </p:sp>
     </p:spTree>
     <p:extLst>
       <p:ext uri="{BB962C8B-B14F-4D97-AF65-F5344CB8AC3E}">
-        <p14:creationId xmlns:p14="http://schemas.microsoft.com/office/powerpoint/2010/main" val="4150906521"/>
+        <p14:creationId xmlns:p14="http://schemas.microsoft.com/office/powerpoint/2010/main" val="1040021484"/>
       </p:ext>
     </p:extLst>
   </p:cSld>
@@ -23044,204 +23634,33 @@
           <a:chExt cx="0" cy="0"/>
         </a:xfrm>
       </p:grpSpPr>
-      <p:pic>
-        <p:nvPicPr>
-          <p:cNvPr id="5" name="Picture 4"/>
-          <p:cNvPicPr>
-            <a:picLocks noChangeAspect="1"/>
-          </p:cNvPicPr>
-          <p:nvPr/>
-        </p:nvPicPr>
-        <p:blipFill>
-          <a:blip r:embed="rId2"/>
-          <a:stretch>
-            <a:fillRect/>
-          </a:stretch>
-        </p:blipFill>
-        <p:spPr>
-          <a:xfrm>
-            <a:off x="0" y="1186546"/>
-            <a:ext cx="5409632" cy="3956954"/>
-          </a:xfrm>
-          <a:prstGeom prst="rect">
-            <a:avLst/>
-          </a:prstGeom>
-        </p:spPr>
-      </p:pic>
-      <p:sp>
-        <p:nvSpPr>
-          <p:cNvPr id="4" name="Rectangle 3"/>
-          <p:cNvSpPr/>
-          <p:nvPr/>
-        </p:nvSpPr>
-        <p:spPr>
-          <a:xfrm>
-            <a:off x="5321301" y="838149"/>
-            <a:ext cx="3784599" cy="5262979"/>
-          </a:xfrm>
-          <a:prstGeom prst="rect">
-            <a:avLst/>
-          </a:prstGeom>
-        </p:spPr>
-        <p:txBody>
-          <a:bodyPr wrap="square">
-            <a:spAutoFit/>
-          </a:bodyPr>
-          <a:lstStyle/>
-          <a:p>
-            <a:pPr marL="342900" indent="-342900">
-              <a:buFont typeface="Arial"/>
-              <a:buChar char="•"/>
-            </a:pPr>
+      <p:sp>
+        <p:nvSpPr>
+          <p:cNvPr id="2" name="Text Placeholder 1"/>
+          <p:cNvSpPr>
+            <a:spLocks noGrp="1"/>
+          </p:cNvSpPr>
+          <p:nvPr>
+            <p:ph type="body" sz="quarter" idx="10"/>
+          </p:nvPr>
+        </p:nvSpPr>
+        <p:spPr/>
+        <p:txBody>
+          <a:bodyPr/>
+          <a:lstStyle/>
+          <a:p>
             <a:r>
-              <a:rPr lang="en-US" sz="1600" b="1" dirty="0"/>
-              <a:t>Hypothesis: </a:t>
+              <a:rPr lang="en-US" dirty="0" smtClean="0"/>
+              <a:t>Appendix</a:t>
             </a:r>
-            <a:r>
-              <a:rPr lang="en-US" sz="1600" dirty="0"/>
-              <a:t>most of the F</a:t>
-            </a:r>
-            <a:r>
-              <a:rPr lang="en-US" sz="1600" dirty="0" smtClean="0"/>
-              <a:t>iber Targets </a:t>
-            </a:r>
-            <a:r>
-              <a:rPr lang="en-US" sz="1600" dirty="0"/>
-              <a:t>are in locations where there is </a:t>
-            </a:r>
-            <a:r>
-              <a:rPr lang="en-US" sz="1600" u="sng" dirty="0"/>
-              <a:t>only one or </a:t>
-            </a:r>
-            <a:r>
-              <a:rPr lang="en-US" sz="1600" u="sng" dirty="0" smtClean="0"/>
-              <a:t>no </a:t>
-            </a:r>
-            <a:r>
-              <a:rPr lang="en-US" sz="1600" u="sng" dirty="0"/>
-              <a:t>service providers</a:t>
-            </a:r>
-            <a:r>
-              <a:rPr lang="en-US" sz="1600" dirty="0"/>
-              <a:t> with speeds sufficient enough for 1 </a:t>
-            </a:r>
-            <a:r>
-              <a:rPr lang="en-US" sz="1600" dirty="0" smtClean="0"/>
-              <a:t>Mbps/student</a:t>
-            </a:r>
-          </a:p>
-          <a:p>
-            <a:pPr marL="342900" indent="-342900">
-              <a:buFont typeface="Arial"/>
-              <a:buChar char="•"/>
-            </a:pPr>
-            <a:endParaRPr lang="en-US" sz="1600" dirty="0" smtClean="0"/>
-          </a:p>
-          <a:p>
-            <a:pPr marL="342900" indent="-342900">
-              <a:buFont typeface="Arial"/>
-              <a:buChar char="•"/>
-            </a:pPr>
-            <a:r>
-              <a:rPr lang="en-US" sz="1600" dirty="0" smtClean="0"/>
-              <a:t>From the distributions, it is indeed true that Fiber Targets have less service providers per census block on average than Not Fiber Targets</a:t>
-            </a:r>
-            <a:r>
-              <a:rPr lang="en-US" sz="1600" baseline="30000" dirty="0" smtClean="0"/>
-              <a:t>1</a:t>
-            </a:r>
-            <a:r>
-              <a:rPr lang="en-US" sz="1600" dirty="0" smtClean="0"/>
-              <a:t>. However, we can’t say that most Fiber Targets are in locations where there is only one or no service providers. </a:t>
-            </a:r>
-          </a:p>
-          <a:p>
-            <a:pPr marL="342900" indent="-342900">
-              <a:buFont typeface="Arial"/>
-              <a:buChar char="•"/>
-            </a:pPr>
-            <a:endParaRPr lang="en-US" sz="1600" dirty="0"/>
-          </a:p>
-          <a:p>
-            <a:pPr marL="342900" indent="-342900">
-              <a:buFont typeface="Arial"/>
-              <a:buChar char="•"/>
-            </a:pPr>
-            <a:r>
-              <a:rPr lang="en-US" sz="1600" b="1" dirty="0" smtClean="0"/>
-              <a:t>Recommendation:</a:t>
-            </a:r>
-            <a:r>
-              <a:rPr lang="en-US" sz="1600" dirty="0" smtClean="0"/>
-              <a:t> Since there are more service providers per Fiber Target census block than anticipated, we should further explore these providers and understand/quantify their ability to serve school districts</a:t>
-            </a:r>
-            <a:endParaRPr lang="en-US" sz="1600" b="1" dirty="0" smtClean="0"/>
-          </a:p>
-          <a:p>
-            <a:pPr marL="342900" indent="-342900">
-              <a:buFont typeface="Arial"/>
-              <a:buChar char="•"/>
-            </a:pPr>
-            <a:endParaRPr lang="en-US" sz="1600" dirty="0" smtClean="0"/>
-          </a:p>
-          <a:p>
-            <a:pPr marL="342900" indent="-342900">
-              <a:buFont typeface="Arial"/>
-              <a:buChar char="•"/>
-            </a:pPr>
-            <a:endParaRPr lang="en-US" sz="1600" i="1" dirty="0" smtClean="0"/>
-          </a:p>
-        </p:txBody>
-      </p:sp>
-      <p:sp>
-        <p:nvSpPr>
-          <p:cNvPr id="6" name="Rectangle 5"/>
-          <p:cNvSpPr/>
-          <p:nvPr/>
-        </p:nvSpPr>
-        <p:spPr>
-          <a:xfrm>
-            <a:off x="88900" y="6101128"/>
-            <a:ext cx="5461000" cy="307777"/>
-          </a:xfrm>
-          <a:prstGeom prst="rect">
-            <a:avLst/>
-          </a:prstGeom>
-        </p:spPr>
-        <p:txBody>
-          <a:bodyPr wrap="square">
-            <a:spAutoFit/>
-          </a:bodyPr>
-          <a:lstStyle/>
-          <a:p>
-            <a:r>
-              <a:rPr lang="en-US" sz="1400" baseline="30000" dirty="0" smtClean="0"/>
-              <a:t>1</a:t>
-            </a:r>
-            <a:r>
-              <a:rPr lang="en-US" sz="1400" dirty="0" smtClean="0"/>
-              <a:t>and </a:t>
-            </a:r>
-            <a:r>
-              <a:rPr lang="en-US" sz="1400" dirty="0"/>
-              <a:t>significantly less according to a one-sided t-test, p-value = </a:t>
-            </a:r>
-            <a:r>
-              <a:rPr lang="en-US" sz="1400" dirty="0" smtClean="0"/>
-              <a:t>3</a:t>
-            </a:r>
-            <a:r>
-              <a:rPr lang="mr-IN" sz="1400" dirty="0" smtClean="0"/>
-              <a:t>.22e-06</a:t>
-            </a:r>
-            <a:endParaRPr lang="en-US" sz="1400" dirty="0"/>
+            <a:endParaRPr lang="en-US" dirty="0"/>
           </a:p>
         </p:txBody>
       </p:sp>
     </p:spTree>
     <p:extLst>
       <p:ext uri="{BB962C8B-B14F-4D97-AF65-F5344CB8AC3E}">
-        <p14:creationId xmlns:p14="http://schemas.microsoft.com/office/powerpoint/2010/main" val="490907997"/>
+        <p14:creationId xmlns:p14="http://schemas.microsoft.com/office/powerpoint/2010/main" val="1145853018"/>
       </p:ext>
     </p:extLst>
   </p:cSld>
@@ -23290,7 +23709,7 @@
           <a:p>
             <a:r>
               <a:rPr lang="en-US" dirty="0" smtClean="0"/>
-              <a:t>References</a:t>
+              <a:t>Methodology</a:t>
             </a:r>
             <a:endParaRPr lang="en-US" dirty="0"/>
           </a:p>
@@ -23305,7 +23724,7 @@
         <p:spPr>
           <a:xfrm>
             <a:off x="425003" y="1233250"/>
-            <a:ext cx="8177130" cy="1631216"/>
+            <a:ext cx="8177130" cy="4693593"/>
           </a:xfrm>
           <a:prstGeom prst="rect">
             <a:avLst/>
@@ -23316,6 +23735,51 @@
             <a:spAutoFit/>
           </a:bodyPr>
           <a:lstStyle/>
+          <a:p>
+            <a:pPr marL="342900" indent="-342900">
+              <a:buFont typeface="Arial"/>
+              <a:buChar char="•"/>
+            </a:pPr>
+            <a:r>
+              <a:rPr lang="en-US" sz="2000" dirty="0" smtClean="0"/>
+              <a:t>Considered all schools and districts in our universe of districts for this analysis</a:t>
+            </a:r>
+          </a:p>
+          <a:p>
+            <a:pPr marL="342900" indent="-342900">
+              <a:buFont typeface="Arial"/>
+              <a:buChar char="•"/>
+            </a:pPr>
+            <a:endParaRPr lang="en-US" sz="2000" dirty="0" smtClean="0"/>
+          </a:p>
+          <a:p>
+            <a:pPr marL="342900" indent="-342900">
+              <a:buFont typeface="Arial"/>
+              <a:buChar char="•"/>
+            </a:pPr>
+            <a:r>
+              <a:rPr lang="en-US" sz="2000" dirty="0" smtClean="0"/>
+              <a:t>Census blocks were linked to schools and districts via latitude and longitude coordinates</a:t>
+            </a:r>
+          </a:p>
+          <a:p>
+            <a:pPr marL="800100" lvl="1" indent="-342900">
+              <a:buFont typeface="Arial"/>
+              <a:buChar char="•"/>
+            </a:pPr>
+            <a:r>
+              <a:rPr lang="en-US" sz="1700" dirty="0" smtClean="0"/>
+              <a:t>Although it’s possible for schools and districts to lie on the boundary of multiple census blocks, none of the districts in our universe met this condition </a:t>
+            </a:r>
+            <a:r>
+              <a:rPr lang="mr-IN" sz="1700" dirty="0" smtClean="0"/>
+              <a:t>–</a:t>
+            </a:r>
+            <a:r>
+              <a:rPr lang="en-US" sz="1700" dirty="0" smtClean="0"/>
+              <a:t> i.e., each district was assigned to a unique block</a:t>
+            </a:r>
+          </a:p>
           <a:p>
             <a:pPr marL="342900" indent="-342900">
               <a:buFont typeface="Arial"/>
@@ -23329,49 +23793,50 @@
               <a:buChar char="•"/>
             </a:pPr>
             <a:r>
-              <a:rPr lang="en-US" sz="2000" dirty="0" smtClean="0">
-                <a:hlinkClick r:id="rId3"/>
-              </a:rPr>
-              <a:t>Form 477 Confluence Page</a:t>
-            </a:r>
-            <a:endParaRPr lang="en-US" sz="2000" dirty="0" smtClean="0"/>
-          </a:p>
-          <a:p>
-            <a:pPr marL="342900" indent="-342900">
-              <a:buFont typeface="Arial"/>
-              <a:buChar char="•"/>
-            </a:pPr>
-            <a:endParaRPr lang="en-US" sz="2000" dirty="0" smtClean="0"/>
-          </a:p>
-          <a:p>
-            <a:pPr marL="342900" indent="-342900">
-              <a:buFont typeface="Arial"/>
-              <a:buChar char="•"/>
-            </a:pPr>
-            <a:r>
-              <a:rPr lang="en-US" sz="2000" dirty="0">
-                <a:hlinkClick r:id="rId4"/>
-              </a:rPr>
-              <a:t>https://</a:t>
+              <a:rPr lang="en-US" sz="2000" dirty="0" smtClean="0"/>
+              <a:t>Distinct service providers within the Form 477 data were identified via their ‘Holding Company Name’ </a:t>
             </a:r>
             <a:r>
-              <a:rPr lang="en-US" sz="2000" dirty="0" smtClean="0">
-                <a:hlinkClick r:id="rId4"/>
-              </a:rPr>
-              <a:t>www2.census.gov/geo/pdfs/maps-data/data/tiger/tgrshp2016/TGRSHP2016_TechDoc.pdf</a:t>
+              <a:rPr lang="en-US" sz="2000" dirty="0"/>
+              <a:t>(as filed on Form 477)</a:t>
             </a:r>
             <a:r>
               <a:rPr lang="en-US" sz="2000" dirty="0" smtClean="0"/>
               <a:t> </a:t>
             </a:r>
-            <a:endParaRPr lang="en-US" sz="2000" dirty="0" smtClean="0"/>
+          </a:p>
+          <a:p>
+            <a:pPr marL="800100" lvl="1" indent="-342900">
+              <a:buFont typeface="Arial"/>
+              <a:buChar char="•"/>
+            </a:pPr>
+            <a:r>
+              <a:rPr lang="en-US" sz="1700" dirty="0" smtClean="0"/>
+              <a:t>This was decided because there were the </a:t>
+            </a:r>
+            <a:r>
+              <a:rPr lang="en-US" sz="1700" i="1" dirty="0" smtClean="0"/>
+              <a:t>least</a:t>
+            </a:r>
+            <a:r>
+              <a:rPr lang="en-US" sz="1700" dirty="0" smtClean="0"/>
+              <a:t> amount of distinct Holding Company Names compared to other service provider name columns, and we want to be conservative and not overestimate the amount of service providers in a census block</a:t>
+            </a:r>
+            <a:endParaRPr lang="en-US" sz="1700" dirty="0"/>
+          </a:p>
+          <a:p>
+            <a:pPr marL="342900" indent="-342900">
+              <a:buFont typeface="Arial"/>
+              <a:buChar char="•"/>
+            </a:pPr>
+            <a:endParaRPr lang="en-US" sz="2000" i="1" dirty="0" smtClean="0"/>
           </a:p>
         </p:txBody>
       </p:sp>
     </p:spTree>
     <p:extLst>
       <p:ext uri="{BB962C8B-B14F-4D97-AF65-F5344CB8AC3E}">
-        <p14:creationId xmlns:p14="http://schemas.microsoft.com/office/powerpoint/2010/main" val="1040021484"/>
+        <p14:creationId xmlns:p14="http://schemas.microsoft.com/office/powerpoint/2010/main" val="64273612"/>
       </p:ext>
     </p:extLst>
   </p:cSld>
@@ -23407,59 +23872,6 @@
       </p:grpSpPr>
       <p:sp>
         <p:nvSpPr>
-          <p:cNvPr id="2" name="Text Placeholder 1"/>
-          <p:cNvSpPr>
-            <a:spLocks noGrp="1"/>
-          </p:cNvSpPr>
-          <p:nvPr>
-            <p:ph type="body" sz="quarter" idx="10"/>
-          </p:nvPr>
-        </p:nvSpPr>
-        <p:spPr/>
-        <p:txBody>
-          <a:bodyPr/>
-          <a:lstStyle/>
-          <a:p>
-            <a:r>
-              <a:rPr lang="en-US" dirty="0" smtClean="0"/>
-              <a:t>Appendix</a:t>
-            </a:r>
-            <a:endParaRPr lang="en-US" dirty="0"/>
-          </a:p>
-        </p:txBody>
-      </p:sp>
-    </p:spTree>
-    <p:extLst>
-      <p:ext uri="{BB962C8B-B14F-4D97-AF65-F5344CB8AC3E}">
-        <p14:creationId xmlns:p14="http://schemas.microsoft.com/office/powerpoint/2010/main" val="1145853018"/>
-      </p:ext>
-    </p:extLst>
-  </p:cSld>
-  <p:clrMapOvr>
-    <a:masterClrMapping/>
-  </p:clrMapOvr>
-</p:sld>
-</file>
-
-<file path=ppt/slides/slide9.xml><?xml version="1.0" encoding="utf-8"?>
-<p:sld xmlns:a="http://schemas.openxmlformats.org/drawingml/2006/main" xmlns:r="http://schemas.openxmlformats.org/officeDocument/2006/relationships" xmlns:p="http://schemas.openxmlformats.org/presentationml/2006/main">
-  <p:cSld>
-    <p:spTree>
-      <p:nvGrpSpPr>
-        <p:cNvPr id="1" name=""/>
-        <p:cNvGrpSpPr/>
-        <p:nvPr/>
-      </p:nvGrpSpPr>
-      <p:grpSpPr>
-        <a:xfrm>
-          <a:off x="0" y="0"/>
-          <a:ext cx="0" cy="0"/>
-          <a:chOff x="0" y="0"/>
-          <a:chExt cx="0" cy="0"/>
-        </a:xfrm>
-      </p:grpSpPr>
-      <p:sp>
-        <p:nvSpPr>
           <p:cNvPr id="2" name="Title 1"/>
           <p:cNvSpPr>
             <a:spLocks noGrp="1"/>
@@ -23578,6 +23990,184 @@
     <p:extLst>
       <p:ext uri="{BB962C8B-B14F-4D97-AF65-F5344CB8AC3E}">
         <p14:creationId xmlns:p14="http://schemas.microsoft.com/office/powerpoint/2010/main" val="1951481105"/>
+      </p:ext>
+    </p:extLst>
+  </p:cSld>
+  <p:clrMapOvr>
+    <a:masterClrMapping/>
+  </p:clrMapOvr>
+  <p:timing>
+    <p:tnLst>
+      <p:par>
+        <p:cTn id="1" dur="indefinite" restart="never" nodeType="tmRoot"/>
+      </p:par>
+    </p:tnLst>
+  </p:timing>
+</p:sld>
+</file>
+
+<file path=ppt/slides/slide9.xml><?xml version="1.0" encoding="utf-8"?>
+<p:sld xmlns:a="http://schemas.openxmlformats.org/drawingml/2006/main" xmlns:r="http://schemas.openxmlformats.org/officeDocument/2006/relationships" xmlns:p="http://schemas.openxmlformats.org/presentationml/2006/main">
+  <p:cSld>
+    <p:spTree>
+      <p:nvGrpSpPr>
+        <p:cNvPr id="1" name=""/>
+        <p:cNvGrpSpPr/>
+        <p:nvPr/>
+      </p:nvGrpSpPr>
+      <p:grpSpPr>
+        <a:xfrm>
+          <a:off x="0" y="0"/>
+          <a:ext cx="0" cy="0"/>
+          <a:chOff x="0" y="0"/>
+          <a:chExt cx="0" cy="0"/>
+        </a:xfrm>
+      </p:grpSpPr>
+      <p:pic>
+        <p:nvPicPr>
+          <p:cNvPr id="6" name="Picture 5"/>
+          <p:cNvPicPr>
+            <a:picLocks noChangeAspect="1"/>
+          </p:cNvPicPr>
+          <p:nvPr/>
+        </p:nvPicPr>
+        <p:blipFill>
+          <a:blip r:embed="rId3">
+            <a:extLst>
+              <a:ext uri="{28A0092B-C50C-407E-A947-70E740481C1C}">
+                <a14:useLocalDpi xmlns:a14="http://schemas.microsoft.com/office/drawing/2010/main" val="0"/>
+              </a:ext>
+            </a:extLst>
+          </a:blip>
+          <a:stretch>
+            <a:fillRect/>
+          </a:stretch>
+        </p:blipFill>
+        <p:spPr>
+          <a:xfrm>
+            <a:off x="895350" y="687755"/>
+            <a:ext cx="7061200" cy="5125064"/>
+          </a:xfrm>
+          <a:prstGeom prst="rect">
+            <a:avLst/>
+          </a:prstGeom>
+        </p:spPr>
+      </p:pic>
+      <p:sp>
+        <p:nvSpPr>
+          <p:cNvPr id="2" name="Title 1"/>
+          <p:cNvSpPr>
+            <a:spLocks noGrp="1"/>
+          </p:cNvSpPr>
+          <p:nvPr>
+            <p:ph type="title"/>
+          </p:nvPr>
+        </p:nvSpPr>
+        <p:spPr>
+          <a:xfrm>
+            <a:off x="425003" y="315632"/>
+            <a:ext cx="8464997" cy="410223"/>
+          </a:xfrm>
+        </p:spPr>
+        <p:txBody>
+          <a:bodyPr/>
+          <a:lstStyle/>
+          <a:p>
+            <a:r>
+              <a:rPr lang="en-US" dirty="0"/>
+              <a:t>Distribution of the number of service providers in a district’s census block </a:t>
+            </a:r>
+            <a:r>
+              <a:rPr lang="en-US" dirty="0" smtClean="0"/>
+              <a:t>by Fiber </a:t>
+            </a:r>
+            <a:r>
+              <a:rPr lang="en-US" dirty="0"/>
+              <a:t>Target </a:t>
+            </a:r>
+            <a:r>
+              <a:rPr lang="en-US" dirty="0" smtClean="0"/>
+              <a:t>Status </a:t>
+            </a:r>
+            <a:r>
+              <a:rPr lang="mr-IN" dirty="0" smtClean="0"/>
+              <a:t>–</a:t>
+            </a:r>
+            <a:r>
+              <a:rPr lang="en-US" dirty="0" smtClean="0"/>
+              <a:t> States</a:t>
+            </a:r>
+            <a:r>
+              <a:rPr lang="en-US" sz="1600" dirty="0" smtClean="0"/>
+              <a:t> with the </a:t>
+            </a:r>
+            <a:r>
+              <a:rPr lang="en-US" sz="1600" i="1" dirty="0" smtClean="0"/>
+              <a:t>largest differences, </a:t>
+            </a:r>
+            <a:r>
+              <a:rPr lang="en-US" sz="1600" dirty="0" smtClean="0"/>
+              <a:t>adjusted for % Fiber Target districts</a:t>
+            </a:r>
+            <a:endParaRPr lang="en-US" sz="1600" i="1" dirty="0"/>
+          </a:p>
+        </p:txBody>
+      </p:sp>
+      <p:sp>
+        <p:nvSpPr>
+          <p:cNvPr id="5" name="Rectangle 4"/>
+          <p:cNvSpPr/>
+          <p:nvPr/>
+        </p:nvSpPr>
+        <p:spPr>
+          <a:xfrm>
+            <a:off x="425003" y="5723235"/>
+            <a:ext cx="8363397" cy="738664"/>
+          </a:xfrm>
+          <a:prstGeom prst="rect">
+            <a:avLst/>
+          </a:prstGeom>
+        </p:spPr>
+        <p:txBody>
+          <a:bodyPr wrap="square">
+            <a:spAutoFit/>
+          </a:bodyPr>
+          <a:lstStyle/>
+          <a:p>
+            <a:pPr marL="285750" indent="-285750">
+              <a:buFont typeface="Arial" charset="0"/>
+              <a:buChar char="•"/>
+            </a:pPr>
+            <a:r>
+              <a:rPr lang="en-US" sz="1400" dirty="0" smtClean="0"/>
+              <a:t>Alaska, Oregon, California and Arizona are the states with the largest difference in distributions of # service providers, with Fiber Targets having less service providers per census block</a:t>
+            </a:r>
+          </a:p>
+          <a:p>
+            <a:pPr marL="285750" indent="-285750">
+              <a:buFont typeface="Arial" charset="0"/>
+              <a:buChar char="•"/>
+            </a:pPr>
+            <a:r>
+              <a:rPr lang="en-US" sz="1400" dirty="0" smtClean="0"/>
+              <a:t>In Wyoming, Fiber Targets actually have </a:t>
+            </a:r>
+            <a:r>
+              <a:rPr lang="en-US" sz="1400" i="1" dirty="0" smtClean="0"/>
+              <a:t>more </a:t>
+            </a:r>
+            <a:r>
+              <a:rPr lang="en-US" sz="1400" dirty="0" smtClean="0"/>
+              <a:t>service providers per census block</a:t>
+            </a:r>
+            <a:endParaRPr lang="en-US" sz="1400" dirty="0"/>
+          </a:p>
+        </p:txBody>
+      </p:sp>
+    </p:spTree>
+    <p:extLst>
+      <p:ext uri="{BB962C8B-B14F-4D97-AF65-F5344CB8AC3E}">
+        <p14:creationId xmlns:p14="http://schemas.microsoft.com/office/powerpoint/2010/main" val="43021936"/>
       </p:ext>
     </p:extLst>
   </p:cSld>

</xml_diff>